<commit_message>
New Project + Capture Camera
Create new project; Capture Camera in new window
</commit_message>
<xml_diff>
--- a/Presentations/Presentation 1.pptx
+++ b/Presentations/Presentation 1.pptx
@@ -611,7 +611,7 @@
         </p:nvSpPr>
         <p:spPr>
           <a:xfrm>
-            <a:off x="381300" y="685800"/>
+            <a:off x="381000" y="685800"/>
             <a:ext cx="6096000" cy="3429000"/>
           </a:xfrm>
           <a:custGeom>
@@ -6057,7 +6057,7 @@
               <a:buChar char="-"/>
             </a:pPr>
             <a:r>
-              <a:rPr lang="pl">
+              <a:rPr lang="pl" dirty="0">
                 <a:latin typeface="Arial"/>
                 <a:ea typeface="Arial"/>
                 <a:cs typeface="Arial"/>
@@ -6075,13 +6075,48 @@
               <a:buChar char="-"/>
             </a:pPr>
             <a:r>
-              <a:rPr lang="pl">
+              <a:rPr lang="pl" dirty="0">
                 <a:latin typeface="Arial"/>
                 <a:ea typeface="Arial"/>
                 <a:cs typeface="Arial"/>
                 <a:sym typeface="Arial"/>
               </a:rPr>
-              <a:t>podsystem do rozpoznawania obrazów wyszukuje pozycje pionków i przekazuje je do podsystemu wizualizacji</a:t>
+              <a:t>podsystem do rozpoznawania obrazów wyszukuje pozycje pionków </a:t>
+            </a:r>
+            <a:r>
+              <a:rPr lang="pl" dirty="0" smtClean="0">
+                <a:latin typeface="Arial"/>
+                <a:ea typeface="Arial"/>
+                <a:cs typeface="Arial"/>
+                <a:sym typeface="Arial"/>
+              </a:rPr>
+              <a:t/>
+            </a:r>
+            <a:br>
+              <a:rPr lang="pl" dirty="0" smtClean="0">
+                <a:latin typeface="Arial"/>
+                <a:ea typeface="Arial"/>
+                <a:cs typeface="Arial"/>
+                <a:sym typeface="Arial"/>
+              </a:rPr>
+            </a:br>
+            <a:r>
+              <a:rPr lang="pl" dirty="0" smtClean="0">
+                <a:latin typeface="Arial"/>
+                <a:ea typeface="Arial"/>
+                <a:cs typeface="Arial"/>
+                <a:sym typeface="Arial"/>
+              </a:rPr>
+              <a:t>i </a:t>
+            </a:r>
+            <a:r>
+              <a:rPr lang="pl" dirty="0">
+                <a:latin typeface="Arial"/>
+                <a:ea typeface="Arial"/>
+                <a:cs typeface="Arial"/>
+                <a:sym typeface="Arial"/>
+              </a:rPr>
+              <a:t>przekazuje je do podsystemu wizualizacji</a:t>
             </a:r>
           </a:p>
           <a:p>
@@ -6093,7 +6128,7 @@
               <a:buChar char="-"/>
             </a:pPr>
             <a:r>
-              <a:rPr lang="pl">
+              <a:rPr lang="pl" dirty="0">
                 <a:latin typeface="Arial"/>
                 <a:ea typeface="Arial"/>
                 <a:cs typeface="Arial"/>
@@ -6110,7 +6145,7 @@
               <a:buChar char="-"/>
             </a:pPr>
             <a:r>
-              <a:rPr lang="pl">
+              <a:rPr lang="pl" dirty="0">
                 <a:latin typeface="Arial"/>
                 <a:ea typeface="Arial"/>
                 <a:cs typeface="Arial"/>
@@ -6119,13 +6154,13 @@
               <a:t>sprawdzanie czy ruch został wykonany zgodnie z zasadami</a:t>
             </a:r>
             <a:r>
-              <a:rPr lang="pl"/>
+              <a:rPr lang="pl" dirty="0"/>
               <a:t/>
             </a:r>
             <a:br>
-              <a:rPr lang="pl"/>
+              <a:rPr lang="pl" dirty="0"/>
             </a:br>
-            <a:endParaRPr lang="pl"/>
+            <a:endParaRPr lang="pl" dirty="0"/>
           </a:p>
         </p:txBody>
       </p:sp>
@@ -6274,23 +6309,14 @@
               <a:buChar char="-"/>
             </a:pPr>
             <a:r>
-              <a:rPr lang="pl" dirty="0">
+              <a:rPr lang="pl" dirty="0" smtClean="0">
                 <a:latin typeface="Arial"/>
                 <a:ea typeface="Arial"/>
                 <a:cs typeface="Arial"/>
                 <a:sym typeface="Arial"/>
               </a:rPr>
-              <a:t>lubimy grać w gry</a:t>
+              <a:t>we </a:t>
             </a:r>
-          </a:p>
-          <a:p>
-            <a:pPr marL="457200" lvl="0" indent="-228600" rtl="0">
-              <a:spcBef>
-                <a:spcPts val="0"/>
-              </a:spcBef>
-              <a:buFont typeface="Arial"/>
-              <a:buChar char="-"/>
-            </a:pPr>
             <a:r>
               <a:rPr lang="pl" dirty="0">
                 <a:latin typeface="Arial"/>
@@ -6298,7 +6324,7 @@
                 <a:cs typeface="Arial"/>
                 <a:sym typeface="Arial"/>
               </a:rPr>
-              <a:t>we wcześniejszych projektach nie wykorzystywaliśmy urządzeń odbierających dane ze świata zewnętrznego – </a:t>
+              <a:t>wcześniejszych projektach nie wykorzystywaliśmy urządzeń odbierających dane ze świata zewnętrznego – </a:t>
             </a:r>
             <a:r>
               <a:rPr lang="pl" i="1" dirty="0">
@@ -6310,7 +6336,7 @@
               <a:t>nie od ludzi </a:t>
             </a:r>
             <a:r>
-              <a:rPr lang="pl" sz="1400" dirty="0">
+              <a:rPr lang="pl" dirty="0">
                 <a:latin typeface="Arial"/>
                 <a:ea typeface="Arial"/>
                 <a:cs typeface="Arial"/>
@@ -6604,7 +6630,7 @@
 </file>
 
 <file path=ppt/slides/slide5.xml><?xml version="1.0" encoding="utf-8"?>
-<p:sld xmlns:a="http://schemas.openxmlformats.org/drawingml/2006/main" xmlns:r="http://schemas.openxmlformats.org/officeDocument/2006/relationships" xmlns:p="http://schemas.openxmlformats.org/presentationml/2006/main">
+<p:sld xmlns:a="http://schemas.openxmlformats.org/drawingml/2006/main" xmlns:r="http://schemas.openxmlformats.org/officeDocument/2006/relationships" xmlns:p="http://schemas.openxmlformats.org/presentationml/2006/main" show="0">
   <p:cSld>
     <p:spTree>
       <p:nvGrpSpPr>
@@ -6973,6 +6999,7 @@
   <p:clrMapOvr>
     <a:masterClrMapping/>
   </p:clrMapOvr>
+  <p:transition/>
   <p:timing>
     <p:tnLst>
       <p:par>
@@ -7377,7 +7404,7 @@
                         <a:buNone/>
                       </a:pPr>
                       <a:r>
-                        <a:rPr lang="pl">
+                        <a:rPr lang="pl" dirty="0">
                           <a:solidFill>
                             <a:schemeClr val="bg2"/>
                           </a:solidFill>

</xml_diff>